<commit_message>
Wrangling the data into CrystalCast format for outputs of incidence prevalence R and hospitalizations.  Prepare to implement regional specific factors "ratio". Reduce the Mild to Recovery time to better fit the ONS data
</commit_message>
<xml_diff>
--- a/Flow Model.pptx
+++ b/Flow Model.pptx
@@ -243,7 +243,7 @@
           <a:p>
             <a:fld id="{FBD7974E-8B7E-4086-A933-8CEF56672A4D}" type="datetimeFigureOut">
               <a:rPr lang="en-GB" smtClean="0"/>
-              <a:t>23/06/2021</a:t>
+              <a:t>15/11/2021</a:t>
             </a:fld>
             <a:endParaRPr lang="en-GB"/>
           </a:p>
@@ -413,7 +413,7 @@
           <a:p>
             <a:fld id="{FBD7974E-8B7E-4086-A933-8CEF56672A4D}" type="datetimeFigureOut">
               <a:rPr lang="en-GB" smtClean="0"/>
-              <a:t>23/06/2021</a:t>
+              <a:t>15/11/2021</a:t>
             </a:fld>
             <a:endParaRPr lang="en-GB"/>
           </a:p>
@@ -593,7 +593,7 @@
           <a:p>
             <a:fld id="{FBD7974E-8B7E-4086-A933-8CEF56672A4D}" type="datetimeFigureOut">
               <a:rPr lang="en-GB" smtClean="0"/>
-              <a:t>23/06/2021</a:t>
+              <a:t>15/11/2021</a:t>
             </a:fld>
             <a:endParaRPr lang="en-GB"/>
           </a:p>
@@ -763,7 +763,7 @@
           <a:p>
             <a:fld id="{FBD7974E-8B7E-4086-A933-8CEF56672A4D}" type="datetimeFigureOut">
               <a:rPr lang="en-GB" smtClean="0"/>
-              <a:t>23/06/2021</a:t>
+              <a:t>15/11/2021</a:t>
             </a:fld>
             <a:endParaRPr lang="en-GB"/>
           </a:p>
@@ -1009,7 +1009,7 @@
           <a:p>
             <a:fld id="{FBD7974E-8B7E-4086-A933-8CEF56672A4D}" type="datetimeFigureOut">
               <a:rPr lang="en-GB" smtClean="0"/>
-              <a:t>23/06/2021</a:t>
+              <a:t>15/11/2021</a:t>
             </a:fld>
             <a:endParaRPr lang="en-GB"/>
           </a:p>
@@ -1241,7 +1241,7 @@
           <a:p>
             <a:fld id="{FBD7974E-8B7E-4086-A933-8CEF56672A4D}" type="datetimeFigureOut">
               <a:rPr lang="en-GB" smtClean="0"/>
-              <a:t>23/06/2021</a:t>
+              <a:t>15/11/2021</a:t>
             </a:fld>
             <a:endParaRPr lang="en-GB"/>
           </a:p>
@@ -1608,7 +1608,7 @@
           <a:p>
             <a:fld id="{FBD7974E-8B7E-4086-A933-8CEF56672A4D}" type="datetimeFigureOut">
               <a:rPr lang="en-GB" smtClean="0"/>
-              <a:t>23/06/2021</a:t>
+              <a:t>15/11/2021</a:t>
             </a:fld>
             <a:endParaRPr lang="en-GB"/>
           </a:p>
@@ -1726,7 +1726,7 @@
           <a:p>
             <a:fld id="{FBD7974E-8B7E-4086-A933-8CEF56672A4D}" type="datetimeFigureOut">
               <a:rPr lang="en-GB" smtClean="0"/>
-              <a:t>23/06/2021</a:t>
+              <a:t>15/11/2021</a:t>
             </a:fld>
             <a:endParaRPr lang="en-GB"/>
           </a:p>
@@ -1821,7 +1821,7 @@
           <a:p>
             <a:fld id="{FBD7974E-8B7E-4086-A933-8CEF56672A4D}" type="datetimeFigureOut">
               <a:rPr lang="en-GB" smtClean="0"/>
-              <a:t>23/06/2021</a:t>
+              <a:t>15/11/2021</a:t>
             </a:fld>
             <a:endParaRPr lang="en-GB"/>
           </a:p>
@@ -2098,7 +2098,7 @@
           <a:p>
             <a:fld id="{FBD7974E-8B7E-4086-A933-8CEF56672A4D}" type="datetimeFigureOut">
               <a:rPr lang="en-GB" smtClean="0"/>
-              <a:t>23/06/2021</a:t>
+              <a:t>15/11/2021</a:t>
             </a:fld>
             <a:endParaRPr lang="en-GB"/>
           </a:p>
@@ -2351,7 +2351,7 @@
           <a:p>
             <a:fld id="{FBD7974E-8B7E-4086-A933-8CEF56672A4D}" type="datetimeFigureOut">
               <a:rPr lang="en-GB" smtClean="0"/>
-              <a:t>23/06/2021</a:t>
+              <a:t>15/11/2021</a:t>
             </a:fld>
             <a:endParaRPr lang="en-GB"/>
           </a:p>
@@ -2564,7 +2564,7 @@
           <a:p>
             <a:fld id="{FBD7974E-8B7E-4086-A933-8CEF56672A4D}" type="datetimeFigureOut">
               <a:rPr lang="en-GB" smtClean="0"/>
-              <a:t>23/06/2021</a:t>
+              <a:t>15/11/2021</a:t>
             </a:fld>
             <a:endParaRPr lang="en-GB"/>
           </a:p>
@@ -3013,7 +3013,7 @@
             <a:pPr algn="ctr"/>
             <a:r>
               <a:rPr lang="en-GB" dirty="0" smtClean="0"/>
-              <a:t>Infected</a:t>
+              <a:t>Case</a:t>
             </a:r>
             <a:endParaRPr lang="en-GB" dirty="0"/>
           </a:p>
@@ -3113,7 +3113,7 @@
             <a:pPr algn="ctr"/>
             <a:r>
               <a:rPr lang="en-GB" dirty="0" smtClean="0"/>
-              <a:t>Positive Test</a:t>
+              <a:t>Illness</a:t>
             </a:r>
             <a:endParaRPr lang="en-GB" dirty="0"/>
           </a:p>
@@ -3484,14 +3484,14 @@
       </p:sp>
       <p:sp>
         <p:nvSpPr>
-          <p:cNvPr id="17" name="Down Arrow 16"/>
+          <p:cNvPr id="18" name="Down Arrow 17"/>
           <p:cNvSpPr/>
           <p:nvPr/>
         </p:nvSpPr>
         <p:spPr>
           <a:xfrm rot="16200000">
-            <a:off x="5422236" y="3835426"/>
-            <a:ext cx="418745" cy="575838"/>
+            <a:off x="8575893" y="3775104"/>
+            <a:ext cx="418745" cy="619570"/>
           </a:xfrm>
           <a:prstGeom prst="downArrow">
             <a:avLst/>
@@ -3527,13 +3527,13 @@
       </p:sp>
       <p:sp>
         <p:nvSpPr>
-          <p:cNvPr id="18" name="Down Arrow 17"/>
+          <p:cNvPr id="19" name="Down Arrow 18"/>
           <p:cNvSpPr/>
           <p:nvPr/>
         </p:nvSpPr>
         <p:spPr>
-          <a:xfrm rot="16200000">
-            <a:off x="8575893" y="3775104"/>
+          <a:xfrm rot="8743072">
+            <a:off x="7441682" y="1124324"/>
             <a:ext cx="418745" cy="619570"/>
           </a:xfrm>
           <a:prstGeom prst="downArrow">
@@ -3570,13 +3570,13 @@
       </p:sp>
       <p:sp>
         <p:nvSpPr>
-          <p:cNvPr id="19" name="Down Arrow 18"/>
+          <p:cNvPr id="20" name="Down Arrow 19"/>
           <p:cNvSpPr/>
           <p:nvPr/>
         </p:nvSpPr>
         <p:spPr>
-          <a:xfrm rot="8743072">
-            <a:off x="7441682" y="1124324"/>
+          <a:xfrm rot="8140667">
+            <a:off x="9309408" y="2866165"/>
             <a:ext cx="418745" cy="619570"/>
           </a:xfrm>
           <a:prstGeom prst="downArrow">
@@ -3613,14 +3613,14 @@
       </p:sp>
       <p:sp>
         <p:nvSpPr>
-          <p:cNvPr id="20" name="Down Arrow 19"/>
+          <p:cNvPr id="21" name="Down Arrow 20"/>
           <p:cNvSpPr/>
           <p:nvPr/>
         </p:nvSpPr>
         <p:spPr>
-          <a:xfrm rot="8140667">
-            <a:off x="9309408" y="2866165"/>
-            <a:ext cx="418745" cy="619570"/>
+          <a:xfrm rot="10102053">
+            <a:off x="6370191" y="1382616"/>
+            <a:ext cx="418745" cy="1884161"/>
           </a:xfrm>
           <a:prstGeom prst="downArrow">
             <a:avLst/>
@@ -3656,14 +3656,14 @@
       </p:sp>
       <p:sp>
         <p:nvSpPr>
-          <p:cNvPr id="21" name="Down Arrow 20"/>
+          <p:cNvPr id="22" name="Down Arrow 21"/>
           <p:cNvSpPr/>
           <p:nvPr/>
         </p:nvSpPr>
         <p:spPr>
-          <a:xfrm rot="10102053">
-            <a:off x="6370191" y="1382616"/>
-            <a:ext cx="418745" cy="1884161"/>
+          <a:xfrm rot="19949879">
+            <a:off x="7198446" y="4812067"/>
+            <a:ext cx="418745" cy="619570"/>
           </a:xfrm>
           <a:prstGeom prst="downArrow">
             <a:avLst/>
@@ -3699,14 +3699,14 @@
       </p:sp>
       <p:sp>
         <p:nvSpPr>
-          <p:cNvPr id="22" name="Down Arrow 21"/>
+          <p:cNvPr id="23" name="Down Arrow 22"/>
           <p:cNvSpPr/>
           <p:nvPr/>
         </p:nvSpPr>
         <p:spPr>
-          <a:xfrm rot="19949879">
-            <a:off x="7198446" y="4812067"/>
-            <a:ext cx="418745" cy="619570"/>
+          <a:xfrm rot="2464594">
+            <a:off x="9005426" y="4518274"/>
+            <a:ext cx="418745" cy="1235737"/>
           </a:xfrm>
           <a:prstGeom prst="downArrow">
             <a:avLst/>
@@ -3742,14 +3742,100 @@
       </p:sp>
       <p:sp>
         <p:nvSpPr>
-          <p:cNvPr id="23" name="Down Arrow 22"/>
+          <p:cNvPr id="24" name="Down Arrow 23"/>
           <p:cNvSpPr/>
           <p:nvPr/>
         </p:nvSpPr>
         <p:spPr>
-          <a:xfrm rot="2464594">
-            <a:off x="9005426" y="4518274"/>
-            <a:ext cx="418745" cy="1235737"/>
+          <a:xfrm rot="16200000">
+            <a:off x="5422236" y="3835426"/>
+            <a:ext cx="418745" cy="575838"/>
+          </a:xfrm>
+          <a:prstGeom prst="downArrow">
+            <a:avLst/>
+          </a:prstGeom>
+          <a:solidFill>
+            <a:schemeClr val="tx1"/>
+          </a:solidFill>
+        </p:spPr>
+        <p:style>
+          <a:lnRef idx="2">
+            <a:schemeClr val="accent1">
+              <a:shade val="50000"/>
+            </a:schemeClr>
+          </a:lnRef>
+          <a:fillRef idx="1">
+            <a:schemeClr val="accent1"/>
+          </a:fillRef>
+          <a:effectRef idx="0">
+            <a:schemeClr val="accent1"/>
+          </a:effectRef>
+          <a:fontRef idx="minor">
+            <a:schemeClr val="lt1"/>
+          </a:fontRef>
+        </p:style>
+        <p:txBody>
+          <a:bodyPr rtlCol="0" anchor="ctr"/>
+          <a:lstStyle/>
+          <a:p>
+            <a:pPr algn="ctr"/>
+            <a:endParaRPr lang="en-GB"/>
+          </a:p>
+        </p:txBody>
+      </p:sp>
+      <p:sp>
+        <p:nvSpPr>
+          <p:cNvPr id="26" name="Down Arrow 25"/>
+          <p:cNvSpPr/>
+          <p:nvPr/>
+        </p:nvSpPr>
+        <p:spPr>
+          <a:xfrm rot="12385507">
+            <a:off x="5307517" y="1357251"/>
+            <a:ext cx="418745" cy="2333923"/>
+          </a:xfrm>
+          <a:prstGeom prst="downArrow">
+            <a:avLst/>
+          </a:prstGeom>
+          <a:solidFill>
+            <a:schemeClr val="tx1"/>
+          </a:solidFill>
+        </p:spPr>
+        <p:style>
+          <a:lnRef idx="2">
+            <a:schemeClr val="accent1">
+              <a:shade val="50000"/>
+            </a:schemeClr>
+          </a:lnRef>
+          <a:fillRef idx="1">
+            <a:schemeClr val="accent1"/>
+          </a:fillRef>
+          <a:effectRef idx="0">
+            <a:schemeClr val="accent1"/>
+          </a:effectRef>
+          <a:fontRef idx="minor">
+            <a:schemeClr val="lt1"/>
+          </a:fontRef>
+        </p:style>
+        <p:txBody>
+          <a:bodyPr rtlCol="0" anchor="ctr"/>
+          <a:lstStyle/>
+          <a:p>
+            <a:pPr algn="ctr"/>
+            <a:endParaRPr lang="en-GB"/>
+          </a:p>
+        </p:txBody>
+      </p:sp>
+      <p:sp>
+        <p:nvSpPr>
+          <p:cNvPr id="27" name="Down Arrow 26"/>
+          <p:cNvSpPr/>
+          <p:nvPr/>
+        </p:nvSpPr>
+        <p:spPr>
+          <a:xfrm rot="18269850">
+            <a:off x="5624088" y="4268351"/>
+            <a:ext cx="418745" cy="1807036"/>
           </a:xfrm>
           <a:prstGeom prst="downArrow">
             <a:avLst/>

</xml_diff>